<commit_message>
edit a little with the slide
</commit_message>
<xml_diff>
--- a/Read_Note_Slide/ProjectProgress.pptx
+++ b/Read_Note_Slide/ProjectProgress.pptx
@@ -108,6 +108,11 @@
       </a:defRPr>
     </a:lvl9pPr>
   </p:defaultTextStyle>
+  <p:extLst>
+    <p:ext uri="{EFAFB233-063F-42B5-8137-9DF3F51BA10A}">
+      <p15:sldGuideLst xmlns:p15="http://schemas.microsoft.com/office/powerpoint/2012/main"/>
+    </p:ext>
+  </p:extLst>
 </p:presentation>
 </file>
 
@@ -242,7 +247,7 @@
           <a:p>
             <a:fld id="{0AD4D205-5D08-4D4F-8E0B-AF9C54FCC34F}" type="datetimeFigureOut">
               <a:rPr lang="en-US" smtClean="0"/>
-              <a:t>4/11/16</a:t>
+              <a:t>4/13/16</a:t>
             </a:fld>
             <a:endParaRPr lang="en-US"/>
           </a:p>
@@ -412,7 +417,7 @@
           <a:p>
             <a:fld id="{0AD4D205-5D08-4D4F-8E0B-AF9C54FCC34F}" type="datetimeFigureOut">
               <a:rPr lang="en-US" smtClean="0"/>
-              <a:t>4/11/16</a:t>
+              <a:t>4/13/16</a:t>
             </a:fld>
             <a:endParaRPr lang="en-US"/>
           </a:p>
@@ -592,7 +597,7 @@
           <a:p>
             <a:fld id="{0AD4D205-5D08-4D4F-8E0B-AF9C54FCC34F}" type="datetimeFigureOut">
               <a:rPr lang="en-US" smtClean="0"/>
-              <a:t>4/11/16</a:t>
+              <a:t>4/13/16</a:t>
             </a:fld>
             <a:endParaRPr lang="en-US"/>
           </a:p>
@@ -762,7 +767,7 @@
           <a:p>
             <a:fld id="{0AD4D205-5D08-4D4F-8E0B-AF9C54FCC34F}" type="datetimeFigureOut">
               <a:rPr lang="en-US" smtClean="0"/>
-              <a:t>4/11/16</a:t>
+              <a:t>4/13/16</a:t>
             </a:fld>
             <a:endParaRPr lang="en-US"/>
           </a:p>
@@ -1006,7 +1011,7 @@
           <a:p>
             <a:fld id="{0AD4D205-5D08-4D4F-8E0B-AF9C54FCC34F}" type="datetimeFigureOut">
               <a:rPr lang="en-US" smtClean="0"/>
-              <a:t>4/11/16</a:t>
+              <a:t>4/13/16</a:t>
             </a:fld>
             <a:endParaRPr lang="en-US"/>
           </a:p>
@@ -1238,7 +1243,7 @@
           <a:p>
             <a:fld id="{0AD4D205-5D08-4D4F-8E0B-AF9C54FCC34F}" type="datetimeFigureOut">
               <a:rPr lang="en-US" smtClean="0"/>
-              <a:t>4/11/16</a:t>
+              <a:t>4/13/16</a:t>
             </a:fld>
             <a:endParaRPr lang="en-US"/>
           </a:p>
@@ -1605,7 +1610,7 @@
           <a:p>
             <a:fld id="{0AD4D205-5D08-4D4F-8E0B-AF9C54FCC34F}" type="datetimeFigureOut">
               <a:rPr lang="en-US" smtClean="0"/>
-              <a:t>4/11/16</a:t>
+              <a:t>4/13/16</a:t>
             </a:fld>
             <a:endParaRPr lang="en-US"/>
           </a:p>
@@ -1723,7 +1728,7 @@
           <a:p>
             <a:fld id="{0AD4D205-5D08-4D4F-8E0B-AF9C54FCC34F}" type="datetimeFigureOut">
               <a:rPr lang="en-US" smtClean="0"/>
-              <a:t>4/11/16</a:t>
+              <a:t>4/13/16</a:t>
             </a:fld>
             <a:endParaRPr lang="en-US"/>
           </a:p>
@@ -1818,7 +1823,7 @@
           <a:p>
             <a:fld id="{0AD4D205-5D08-4D4F-8E0B-AF9C54FCC34F}" type="datetimeFigureOut">
               <a:rPr lang="en-US" smtClean="0"/>
-              <a:t>4/11/16</a:t>
+              <a:t>4/13/16</a:t>
             </a:fld>
             <a:endParaRPr lang="en-US"/>
           </a:p>
@@ -2095,7 +2100,7 @@
           <a:p>
             <a:fld id="{0AD4D205-5D08-4D4F-8E0B-AF9C54FCC34F}" type="datetimeFigureOut">
               <a:rPr lang="en-US" smtClean="0"/>
-              <a:t>4/11/16</a:t>
+              <a:t>4/13/16</a:t>
             </a:fld>
             <a:endParaRPr lang="en-US"/>
           </a:p>
@@ -2352,7 +2357,7 @@
           <a:p>
             <a:fld id="{0AD4D205-5D08-4D4F-8E0B-AF9C54FCC34F}" type="datetimeFigureOut">
               <a:rPr lang="en-US" smtClean="0"/>
-              <a:t>4/11/16</a:t>
+              <a:t>4/13/16</a:t>
             </a:fld>
             <a:endParaRPr lang="en-US"/>
           </a:p>
@@ -2565,7 +2570,7 @@
           <a:p>
             <a:fld id="{0AD4D205-5D08-4D4F-8E0B-AF9C54FCC34F}" type="datetimeFigureOut">
               <a:rPr lang="en-US" smtClean="0"/>
-              <a:t>4/11/16</a:t>
+              <a:t>4/13/16</a:t>
             </a:fld>
             <a:endParaRPr lang="en-US"/>
           </a:p>
@@ -3552,13 +3557,7 @@
               <a:rPr lang="en-US" sz="1400" dirty="0" smtClean="0">
                 <a:effectLst/>
               </a:rPr>
-              <a:t>(</a:t>
-            </a:r>
-            <a:r>
-              <a:rPr lang="en-US" sz="1400" dirty="0" smtClean="0">
-                <a:effectLst/>
-              </a:rPr>
-              <a:t>2015)</a:t>
+              <a:t>(2015)</a:t>
             </a:r>
           </a:p>
           <a:p>
@@ -4039,7 +4038,15 @@
             </a:pPr>
             <a:r>
               <a:rPr lang="en-US" dirty="0" smtClean="0"/>
-              <a:t>According to the leave-one-out cross validation, the average accuracy for predicting the label of the residue is </a:t>
+              <a:t>According to the leave-one-out cross validation, the average accuracy for predicting the label of the residue </a:t>
+            </a:r>
+            <a:r>
+              <a:rPr lang="en-US" smtClean="0"/>
+              <a:t>is </a:t>
+            </a:r>
+            <a:r>
+              <a:rPr lang="en-US" altLang="zh-CN" smtClean="0"/>
+              <a:t>80.4%</a:t>
             </a:r>
             <a:endParaRPr lang="en-US" dirty="0"/>
           </a:p>

</xml_diff>